<commit_message>
slides: fix qc102 slide 9 invalid vector dimension
</commit_message>
<xml_diff>
--- a/Slides/pptx/qc102.pptx
+++ b/Slides/pptx/qc102.pptx
@@ -20268,6 +20268,59 @@
                       </p:childTnLst>
                     </p:cTn>
                   </p:par>
+                  <p:par>
+                    <p:cTn fill="hold">
+                      <p:stCondLst>
+                        <p:cond delay="indefinite"/>
+                      </p:stCondLst>
+                      <p:childTnLst>
+                        <p:par>
+                          <p:cTn fill="hold">
+                            <p:stCondLst>
+                              <p:cond delay="0"/>
+                            </p:stCondLst>
+                            <p:childTnLst>
+                              <p:par>
+                                <p:cTn fill="hold" nodeType="clickEffect" presetClass="entr" presetID="10" presetSubtype="0">
+                                  <p:stCondLst>
+                                    <p:cond delay="0"/>
+                                  </p:stCondLst>
+                                  <p:childTnLst>
+                                    <p:set>
+                                      <p:cBhvr>
+                                        <p:cTn dur="1" fill="hold">
+                                          <p:stCondLst>
+                                            <p:cond delay="0"/>
+                                          </p:stCondLst>
+                                        </p:cTn>
+                                        <p:tgtEl>
+                                          <p:spTgt spid="79"/>
+                                        </p:tgtEl>
+                                        <p:attrNameLst>
+                                          <p:attrName>style.visibility</p:attrName>
+                                        </p:attrNameLst>
+                                      </p:cBhvr>
+                                      <p:to>
+                                        <p:strVal val="visible"/>
+                                      </p:to>
+                                    </p:set>
+                                    <p:animEffect filter="fade" transition="in">
+                                      <p:cBhvr>
+                                        <p:cTn dur="1000"/>
+                                        <p:tgtEl>
+                                          <p:spTgt spid="79"/>
+                                        </p:tgtEl>
+                                      </p:cBhvr>
+                                    </p:animEffect>
+                                  </p:childTnLst>
+                                </p:cTn>
+                              </p:par>
+                            </p:childTnLst>
+                          </p:cTn>
+                        </p:par>
+                      </p:childTnLst>
+                    </p:cTn>
+                  </p:par>
                 </p:childTnLst>
               </p:cTn>
               <p:prevCondLst>
@@ -24775,9 +24828,37 @@
           <a:chExt cx="0" cy="0"/>
         </a:xfrm>
       </p:grpSpPr>
+      <p:pic>
+        <p:nvPicPr>
+          <p:cNvPr id="164" name="Google Shape;164;p21"/>
+          <p:cNvPicPr preferRelativeResize="0"/>
+          <p:nvPr/>
+        </p:nvPicPr>
+        <p:blipFill>
+          <a:blip r:embed="rId3">
+            <a:alphaModFix/>
+          </a:blip>
+          <a:stretch>
+            <a:fillRect/>
+          </a:stretch>
+        </p:blipFill>
+        <p:spPr>
+          <a:xfrm>
+            <a:off x="165450" y="791300"/>
+            <a:ext cx="3562099" cy="2494975"/>
+          </a:xfrm>
+          <a:prstGeom prst="rect">
+            <a:avLst/>
+          </a:prstGeom>
+          <a:noFill/>
+          <a:ln>
+            <a:noFill/>
+          </a:ln>
+        </p:spPr>
+      </p:pic>
       <p:sp>
         <p:nvSpPr>
-          <p:cNvPr id="164" name="Google Shape;164;p21"/>
+          <p:cNvPr id="165" name="Google Shape;165;p21"/>
           <p:cNvSpPr txBox="1"/>
           <p:nvPr>
             <p:ph idx="1" type="body"/>
@@ -24831,34 +24912,6 @@
           </a:p>
         </p:txBody>
       </p:sp>
-      <p:pic>
-        <p:nvPicPr>
-          <p:cNvPr id="165" name="Google Shape;165;p21"/>
-          <p:cNvPicPr preferRelativeResize="0"/>
-          <p:nvPr/>
-        </p:nvPicPr>
-        <p:blipFill>
-          <a:blip r:embed="rId3">
-            <a:alphaModFix/>
-          </a:blip>
-          <a:stretch>
-            <a:fillRect/>
-          </a:stretch>
-        </p:blipFill>
-        <p:spPr>
-          <a:xfrm>
-            <a:off x="231500" y="605625"/>
-            <a:ext cx="3390125" cy="2653150"/>
-          </a:xfrm>
-          <a:prstGeom prst="rect">
-            <a:avLst/>
-          </a:prstGeom>
-          <a:noFill/>
-          <a:ln>
-            <a:noFill/>
-          </a:ln>
-        </p:spPr>
-      </p:pic>
       <p:sp>
         <p:nvSpPr>
           <p:cNvPr id="166" name="Google Shape;166;p21"/>
@@ -25105,13 +25158,13 @@
         </p:nvSpPr>
         <p:spPr>
           <a:xfrm>
-            <a:off x="2755200" y="2388300"/>
+            <a:off x="2815175" y="2473300"/>
             <a:ext cx="2715300" cy="666600"/>
           </a:xfrm>
           <a:prstGeom prst="wedgeRectCallout">
             <a:avLst>
-              <a:gd fmla="val -79169" name="adj1"/>
-              <a:gd fmla="val -148792" name="adj2"/>
+              <a:gd fmla="val -78598" name="adj1"/>
+              <a:gd fmla="val -136191" name="adj2"/>
             </a:avLst>
           </a:prstGeom>
           <a:solidFill>
@@ -25230,13 +25283,13 @@
         </p:nvSpPr>
         <p:spPr>
           <a:xfrm>
-            <a:off x="1891950" y="3330650"/>
+            <a:off x="1931925" y="3286275"/>
             <a:ext cx="2592900" cy="563700"/>
           </a:xfrm>
           <a:prstGeom prst="wedgeRectCallout">
             <a:avLst>
-              <a:gd fmla="val -45555" name="adj1"/>
-              <a:gd fmla="val -229642" name="adj2"/>
+              <a:gd fmla="val -48582" name="adj1"/>
+              <a:gd fmla="val -216370" name="adj2"/>
             </a:avLst>
           </a:prstGeom>
           <a:solidFill>

</xml_diff>